<commit_message>
updated code and slides
</commit_message>
<xml_diff>
--- a/Food Supply and Death Attributed to Obesity.pptx
+++ b/Food Supply and Death Attributed to Obesity.pptx
@@ -173,7 +173,7 @@
 <file path=ppt/revisionInfo.xml><?xml version="1.0" encoding="utf-8"?>
 <p1510:revInfo xmlns:a="http://schemas.openxmlformats.org/drawingml/2006/main" xmlns:r="http://schemas.openxmlformats.org/officeDocument/2006/relationships" xmlns:p1510="http://schemas.microsoft.com/office/powerpoint/2015/10/main">
   <p1510:revLst>
-    <p1510:client id="{FF732D79-CA21-4845-BACE-DFDD3B0FB27C}" v="55" dt="2023-12-17T17:12:53.419"/>
+    <p1510:client id="{FF732D79-CA21-4845-BACE-DFDD3B0FB27C}" v="56" dt="2023-12-17T18:49:18.807"/>
   </p1510:revLst>
 </p1510:revInfo>
 </file>
@@ -243,7 +243,7 @@
   <pc:docChgLst>
     <pc:chgData name="Ken Ye" userId="f83821d1-7357-4244-918d-fd05f8efe6cd" providerId="ADAL" clId="{FF732D79-CA21-4845-BACE-DFDD3B0FB27C}"/>
     <pc:docChg chg="undo custSel addSld delSld modSld">
-      <pc:chgData name="Ken Ye" userId="f83821d1-7357-4244-918d-fd05f8efe6cd" providerId="ADAL" clId="{FF732D79-CA21-4845-BACE-DFDD3B0FB27C}" dt="2023-12-17T17:24:01.979" v="1200" actId="20577"/>
+      <pc:chgData name="Ken Ye" userId="f83821d1-7357-4244-918d-fd05f8efe6cd" providerId="ADAL" clId="{FF732D79-CA21-4845-BACE-DFDD3B0FB27C}" dt="2023-12-17T18:49:22.718" v="1203" actId="1076"/>
       <pc:docMkLst>
         <pc:docMk/>
       </pc:docMkLst>
@@ -572,11 +572,19 @@
         </pc:spChg>
       </pc:sldChg>
       <pc:sldChg chg="addSp delSp modSp add mod">
-        <pc:chgData name="Ken Ye" userId="f83821d1-7357-4244-918d-fd05f8efe6cd" providerId="ADAL" clId="{FF732D79-CA21-4845-BACE-DFDD3B0FB27C}" dt="2023-12-17T17:13:02.104" v="1009" actId="27614"/>
+        <pc:chgData name="Ken Ye" userId="f83821d1-7357-4244-918d-fd05f8efe6cd" providerId="ADAL" clId="{FF732D79-CA21-4845-BACE-DFDD3B0FB27C}" dt="2023-12-17T18:49:22.718" v="1203" actId="1076"/>
         <pc:sldMkLst>
           <pc:docMk/>
           <pc:sldMk cId="2898007255" sldId="270"/>
         </pc:sldMkLst>
+        <pc:spChg chg="add del mod">
+          <ac:chgData name="Ken Ye" userId="f83821d1-7357-4244-918d-fd05f8efe6cd" providerId="ADAL" clId="{FF732D79-CA21-4845-BACE-DFDD3B0FB27C}" dt="2023-12-17T18:49:18.807" v="1202"/>
+          <ac:spMkLst>
+            <pc:docMk/>
+            <pc:sldMk cId="2898007255" sldId="270"/>
+            <ac:spMk id="4" creationId="{D0073EC3-59A8-245B-D8E5-51AEA33E576C}"/>
+          </ac:spMkLst>
+        </pc:spChg>
         <pc:spChg chg="mod">
           <ac:chgData name="Ken Ye" userId="f83821d1-7357-4244-918d-fd05f8efe6cd" providerId="ADAL" clId="{FF732D79-CA21-4845-BACE-DFDD3B0FB27C}" dt="2023-12-17T17:12:59.591" v="1008" actId="26606"/>
           <ac:spMkLst>
@@ -593,12 +601,20 @@
             <ac:spMk id="6" creationId="{00000000-0000-0000-0000-000000000000}"/>
           </ac:spMkLst>
         </pc:spChg>
-        <pc:picChg chg="add mod">
-          <ac:chgData name="Ken Ye" userId="f83821d1-7357-4244-918d-fd05f8efe6cd" providerId="ADAL" clId="{FF732D79-CA21-4845-BACE-DFDD3B0FB27C}" dt="2023-12-17T17:13:02.104" v="1009" actId="27614"/>
+        <pc:picChg chg="add del mod">
+          <ac:chgData name="Ken Ye" userId="f83821d1-7357-4244-918d-fd05f8efe6cd" providerId="ADAL" clId="{FF732D79-CA21-4845-BACE-DFDD3B0FB27C}" dt="2023-12-17T18:48:55.695" v="1201" actId="478"/>
           <ac:picMkLst>
             <pc:docMk/>
             <pc:sldMk cId="2898007255" sldId="270"/>
             <ac:picMk id="2" creationId="{C219933B-67BC-515B-33BB-677A7A5EC0E5}"/>
+          </ac:picMkLst>
+        </pc:picChg>
+        <pc:picChg chg="add mod">
+          <ac:chgData name="Ken Ye" userId="f83821d1-7357-4244-918d-fd05f8efe6cd" providerId="ADAL" clId="{FF732D79-CA21-4845-BACE-DFDD3B0FB27C}" dt="2023-12-17T18:49:22.718" v="1203" actId="1076"/>
+          <ac:picMkLst>
+            <pc:docMk/>
+            <pc:sldMk cId="2898007255" sldId="270"/>
+            <ac:picMk id="7" creationId="{15AB2C9F-25E3-273A-F5E5-A9EFDC917141}"/>
           </ac:picMkLst>
         </pc:picChg>
       </pc:sldChg>
@@ -8635,10 +8651,10 @@
       </p:sp>
       <p:pic>
         <p:nvPicPr>
-          <p:cNvPr id="2" name="Content Placeholder 1" descr="A table with text on it&#10;&#10;Description automatically generated">
+          <p:cNvPr id="7" name="Content Placeholder 6">
             <a:extLst>
               <a:ext uri="{FF2B5EF4-FFF2-40B4-BE49-F238E27FC236}">
-                <a16:creationId xmlns:a16="http://schemas.microsoft.com/office/drawing/2014/main" id="{C219933B-67BC-515B-33BB-677A7A5EC0E5}"/>
+                <a16:creationId xmlns:a16="http://schemas.microsoft.com/office/drawing/2014/main" id="{15AB2C9F-25E3-273A-F5E5-A9EFDC917141}"/>
               </a:ext>
             </a:extLst>
           </p:cNvPr>
@@ -8657,13 +8673,12 @@
         </p:blipFill>
         <p:spPr>
           <a:xfrm>
-            <a:off x="3106177" y="1600200"/>
-            <a:ext cx="5976471" cy="4572000"/>
+            <a:off x="3205162" y="1600200"/>
+            <a:ext cx="5778500" cy="4152900"/>
           </a:xfrm>
           <a:prstGeom prst="rect">
             <a:avLst/>
           </a:prstGeom>
-          <a:noFill/>
         </p:spPr>
       </p:pic>
     </p:spTree>

</xml_diff>

<commit_message>
Update Food Supply and Death Attributed to Obesity.pptx
</commit_message>
<xml_diff>
--- a/Food Supply and Death Attributed to Obesity.pptx
+++ b/Food Supply and Death Attributed to Obesity.pptx
@@ -5,10 +5,10 @@
     <p:sldMasterId id="2147483648" r:id="rId4"/>
   </p:sldMasterIdLst>
   <p:notesMasterIdLst>
-    <p:notesMasterId r:id="rId33"/>
+    <p:notesMasterId r:id="rId34"/>
   </p:notesMasterIdLst>
   <p:handoutMasterIdLst>
-    <p:handoutMasterId r:id="rId34"/>
+    <p:handoutMasterId r:id="rId35"/>
   </p:handoutMasterIdLst>
   <p:sldIdLst>
     <p:sldId id="256" r:id="rId5"/>
@@ -39,6 +39,7 @@
     <p:sldId id="284" r:id="rId30"/>
     <p:sldId id="268" r:id="rId31"/>
     <p:sldId id="272" r:id="rId32"/>
+    <p:sldId id="286" r:id="rId33"/>
   </p:sldIdLst>
   <p:sldSz cx="12188825" cy="6858000"/>
   <p:notesSz cx="6858000" cy="9144000"/>
@@ -173,7 +174,7 @@
 <file path=ppt/revisionInfo.xml><?xml version="1.0" encoding="utf-8"?>
 <p1510:revInfo xmlns:a="http://schemas.openxmlformats.org/drawingml/2006/main" xmlns:r="http://schemas.openxmlformats.org/officeDocument/2006/relationships" xmlns:p1510="http://schemas.microsoft.com/office/powerpoint/2015/10/main">
   <p1510:revLst>
-    <p1510:client id="{FF732D79-CA21-4845-BACE-DFDD3B0FB27C}" v="56" dt="2023-12-17T18:49:18.807"/>
+    <p1510:client id="{FF732D79-CA21-4845-BACE-DFDD3B0FB27C}" v="59" dt="2023-12-17T19:27:33.192"/>
   </p1510:revLst>
 </p1510:revInfo>
 </file>
@@ -243,7 +244,7 @@
   <pc:docChgLst>
     <pc:chgData name="Ken Ye" userId="f83821d1-7357-4244-918d-fd05f8efe6cd" providerId="ADAL" clId="{FF732D79-CA21-4845-BACE-DFDD3B0FB27C}"/>
     <pc:docChg chg="undo custSel addSld delSld modSld">
-      <pc:chgData name="Ken Ye" userId="f83821d1-7357-4244-918d-fd05f8efe6cd" providerId="ADAL" clId="{FF732D79-CA21-4845-BACE-DFDD3B0FB27C}" dt="2023-12-17T18:49:22.718" v="1203" actId="1076"/>
+      <pc:chgData name="Ken Ye" userId="f83821d1-7357-4244-918d-fd05f8efe6cd" providerId="ADAL" clId="{FF732D79-CA21-4845-BACE-DFDD3B0FB27C}" dt="2023-12-17T19:27:42.386" v="1220" actId="20577"/>
       <pc:docMkLst>
         <pc:docMk/>
       </pc:docMkLst>
@@ -1055,6 +1056,35 @@
           </ac:spMkLst>
         </pc:spChg>
       </pc:sldChg>
+      <pc:sldChg chg="new del">
+        <pc:chgData name="Ken Ye" userId="f83821d1-7357-4244-918d-fd05f8efe6cd" providerId="ADAL" clId="{FF732D79-CA21-4845-BACE-DFDD3B0FB27C}" dt="2023-12-17T19:27:35.078" v="1208" actId="2696"/>
+        <pc:sldMkLst>
+          <pc:docMk/>
+          <pc:sldMk cId="1449730693" sldId="285"/>
+        </pc:sldMkLst>
+      </pc:sldChg>
+      <pc:sldChg chg="add del">
+        <pc:chgData name="Ken Ye" userId="f83821d1-7357-4244-918d-fd05f8efe6cd" providerId="ADAL" clId="{FF732D79-CA21-4845-BACE-DFDD3B0FB27C}" dt="2023-12-17T19:27:30.396" v="1206"/>
+        <pc:sldMkLst>
+          <pc:docMk/>
+          <pc:sldMk cId="37477778" sldId="286"/>
+        </pc:sldMkLst>
+      </pc:sldChg>
+      <pc:sldChg chg="modSp add mod">
+        <pc:chgData name="Ken Ye" userId="f83821d1-7357-4244-918d-fd05f8efe6cd" providerId="ADAL" clId="{FF732D79-CA21-4845-BACE-DFDD3B0FB27C}" dt="2023-12-17T19:27:42.386" v="1220" actId="20577"/>
+        <pc:sldMkLst>
+          <pc:docMk/>
+          <pc:sldMk cId="1105442391" sldId="286"/>
+        </pc:sldMkLst>
+        <pc:spChg chg="mod">
+          <ac:chgData name="Ken Ye" userId="f83821d1-7357-4244-918d-fd05f8efe6cd" providerId="ADAL" clId="{FF732D79-CA21-4845-BACE-DFDD3B0FB27C}" dt="2023-12-17T19:27:42.386" v="1220" actId="20577"/>
+          <ac:spMkLst>
+            <pc:docMk/>
+            <pc:sldMk cId="1105442391" sldId="286"/>
+            <ac:spMk id="2" creationId="{52317987-65F3-5E85-D989-11B7BB1EFFC9}"/>
+          </ac:spMkLst>
+        </pc:spChg>
+      </pc:sldChg>
     </pc:docChg>
   </pc:docChgLst>
 </pc:chgInfo>
@@ -9430,6 +9460,96 @@
     <p:extLst>
       <p:ext uri="{BB962C8B-B14F-4D97-AF65-F5344CB8AC3E}">
         <p14:creationId xmlns:p14="http://schemas.microsoft.com/office/powerpoint/2010/main" val="270184597"/>
+      </p:ext>
+    </p:extLst>
+  </p:cSld>
+  <p:clrMapOvr>
+    <a:masterClrMapping/>
+  </p:clrMapOvr>
+  <mc:AlternateContent xmlns:mc="http://schemas.openxmlformats.org/markup-compatibility/2006" xmlns:p14="http://schemas.microsoft.com/office/powerpoint/2010/main">
+    <mc:Choice Requires="p14">
+      <p:transition spd="med" p14:dur="700">
+        <p:fade/>
+      </p:transition>
+    </mc:Choice>
+    <mc:Fallback xmlns="">
+      <p:transition spd="med">
+        <p:fade/>
+      </p:transition>
+    </mc:Fallback>
+  </mc:AlternateContent>
+</p:sld>
+</file>
+
+<file path=ppt/slides/slide29.xml><?xml version="1.0" encoding="utf-8"?>
+<p:sld xmlns:a="http://schemas.openxmlformats.org/drawingml/2006/main" xmlns:r="http://schemas.openxmlformats.org/officeDocument/2006/relationships" xmlns:p="http://schemas.openxmlformats.org/presentationml/2006/main">
+  <p:cSld>
+    <p:spTree>
+      <p:nvGrpSpPr>
+        <p:cNvPr id="1" name=""/>
+        <p:cNvGrpSpPr/>
+        <p:nvPr/>
+      </p:nvGrpSpPr>
+      <p:grpSpPr>
+        <a:xfrm>
+          <a:off x="0" y="0"/>
+          <a:ext cx="0" cy="0"/>
+          <a:chOff x="0" y="0"/>
+          <a:chExt cx="0" cy="0"/>
+        </a:xfrm>
+      </p:grpSpPr>
+      <p:sp>
+        <p:nvSpPr>
+          <p:cNvPr id="2" name="Title 1">
+            <a:extLst>
+              <a:ext uri="{FF2B5EF4-FFF2-40B4-BE49-F238E27FC236}">
+                <a16:creationId xmlns:a16="http://schemas.microsoft.com/office/drawing/2014/main" id="{52317987-65F3-5E85-D989-11B7BB1EFFC9}"/>
+              </a:ext>
+            </a:extLst>
+          </p:cNvPr>
+          <p:cNvSpPr>
+            <a:spLocks noGrp="1"/>
+          </p:cNvSpPr>
+          <p:nvPr>
+            <p:ph type="title"/>
+          </p:nvPr>
+        </p:nvSpPr>
+        <p:spPr>
+          <a:xfrm>
+            <a:off x="1828324" y="1932518"/>
+            <a:ext cx="9141619" cy="2105367"/>
+          </a:xfrm>
+        </p:spPr>
+        <p:txBody>
+          <a:bodyPr anchor="b">
+            <a:normAutofit/>
+          </a:bodyPr>
+          <a:lstStyle/>
+          <a:p>
+            <a:r>
+              <a:rPr lang="en-US" altLang="zh-CN" dirty="0"/>
+              <a:t>Thank</a:t>
+            </a:r>
+            <a:r>
+              <a:rPr lang="zh-CN" altLang="en-US" dirty="0"/>
+              <a:t> </a:t>
+            </a:r>
+            <a:r>
+              <a:rPr lang="en-US" altLang="zh-CN"/>
+              <a:t>You</a:t>
+            </a:r>
+            <a:r>
+              <a:rPr lang="en-US" altLang="zh-CN" dirty="0"/>
+              <a:t>!</a:t>
+            </a:r>
+            <a:endParaRPr lang="en-US" dirty="0"/>
+          </a:p>
+        </p:txBody>
+      </p:sp>
+    </p:spTree>
+    <p:extLst>
+      <p:ext uri="{BB962C8B-B14F-4D97-AF65-F5344CB8AC3E}">
+        <p14:creationId xmlns:p14="http://schemas.microsoft.com/office/powerpoint/2010/main" val="1105442391"/>
       </p:ext>
     </p:extLst>
   </p:cSld>

</xml_diff>